<commit_message>
finished ppt and word doc
requires revision
</commit_message>
<xml_diff>
--- a/4925 PROJECT FOLDER/COMP4925 , sub-project 1.pptx
+++ b/4925 PROJECT FOLDER/COMP4925 , sub-project 1.pptx
@@ -12,9 +12,14 @@
     <p:sldId id="260" r:id="rId6"/>
     <p:sldId id="261" r:id="rId7"/>
     <p:sldId id="264" r:id="rId8"/>
-    <p:sldId id="262" r:id="rId9"/>
-    <p:sldId id="265" r:id="rId10"/>
+    <p:sldId id="265" r:id="rId9"/>
+    <p:sldId id="262" r:id="rId10"/>
     <p:sldId id="263" r:id="rId11"/>
+    <p:sldId id="266" r:id="rId12"/>
+    <p:sldId id="267" r:id="rId13"/>
+    <p:sldId id="268" r:id="rId14"/>
+    <p:sldId id="269" r:id="rId15"/>
+    <p:sldId id="270" r:id="rId16"/>
   </p:sldIdLst>
   <p:sldSz cx="12192000" cy="6858000"/>
   <p:notesSz cx="6858000" cy="9144000"/>
@@ -5979,10 +5984,795 @@
           <a:chExt cx="0" cy="0"/>
         </a:xfrm>
       </p:grpSpPr>
+      <p:sp>
+        <p:nvSpPr>
+          <p:cNvPr id="2" name="Title 1"/>
+          <p:cNvSpPr txBox="1">
+            <a:spLocks/>
+          </p:cNvSpPr>
+          <p:nvPr/>
+        </p:nvSpPr>
+        <p:spPr>
+          <a:xfrm>
+            <a:off x="1295402" y="982132"/>
+            <a:ext cx="9601196" cy="1303867"/>
+          </a:xfrm>
+          <a:prstGeom prst="rect">
+            <a:avLst/>
+          </a:prstGeom>
+        </p:spPr>
+        <p:txBody>
+          <a:bodyPr/>
+          <a:lstStyle>
+            <a:lvl1pPr algn="ctr" defTabSz="457200" rtl="0" eaLnBrk="1" latinLnBrk="0" hangingPunct="1">
+              <a:spcBef>
+                <a:spcPct val="0"/>
+              </a:spcBef>
+              <a:buNone/>
+              <a:defRPr sz="4400" kern="1200" cap="none">
+                <a:ln w="3175" cmpd="sng">
+                  <a:noFill/>
+                </a:ln>
+                <a:solidFill>
+                  <a:schemeClr val="tx1">
+                    <a:lumMod val="85000"/>
+                    <a:lumOff val="15000"/>
+                  </a:schemeClr>
+                </a:solidFill>
+                <a:effectLst/>
+                <a:latin typeface="+mj-lt"/>
+                <a:ea typeface="+mj-ea"/>
+                <a:cs typeface="+mj-cs"/>
+              </a:defRPr>
+            </a:lvl1pPr>
+            <a:lvl2pPr eaLnBrk="1" hangingPunct="1">
+              <a:defRPr>
+                <a:solidFill>
+                  <a:schemeClr val="tx2"/>
+                </a:solidFill>
+              </a:defRPr>
+            </a:lvl2pPr>
+            <a:lvl3pPr eaLnBrk="1" hangingPunct="1">
+              <a:defRPr>
+                <a:solidFill>
+                  <a:schemeClr val="tx2"/>
+                </a:solidFill>
+              </a:defRPr>
+            </a:lvl3pPr>
+            <a:lvl4pPr eaLnBrk="1" hangingPunct="1">
+              <a:defRPr>
+                <a:solidFill>
+                  <a:schemeClr val="tx2"/>
+                </a:solidFill>
+              </a:defRPr>
+            </a:lvl4pPr>
+            <a:lvl5pPr eaLnBrk="1" hangingPunct="1">
+              <a:defRPr>
+                <a:solidFill>
+                  <a:schemeClr val="tx2"/>
+                </a:solidFill>
+              </a:defRPr>
+            </a:lvl5pPr>
+            <a:lvl6pPr eaLnBrk="1" hangingPunct="1">
+              <a:defRPr>
+                <a:solidFill>
+                  <a:schemeClr val="tx2"/>
+                </a:solidFill>
+              </a:defRPr>
+            </a:lvl6pPr>
+            <a:lvl7pPr eaLnBrk="1" hangingPunct="1">
+              <a:defRPr>
+                <a:solidFill>
+                  <a:schemeClr val="tx2"/>
+                </a:solidFill>
+              </a:defRPr>
+            </a:lvl7pPr>
+            <a:lvl8pPr eaLnBrk="1" hangingPunct="1">
+              <a:defRPr>
+                <a:solidFill>
+                  <a:schemeClr val="tx2"/>
+                </a:solidFill>
+              </a:defRPr>
+            </a:lvl8pPr>
+            <a:lvl9pPr eaLnBrk="1" hangingPunct="1">
+              <a:defRPr>
+                <a:solidFill>
+                  <a:schemeClr val="tx2"/>
+                </a:solidFill>
+              </a:defRPr>
+            </a:lvl9pPr>
+          </a:lstStyle>
+          <a:p>
+            <a:r>
+              <a:rPr lang="en-CA" dirty="0" smtClean="0"/>
+              <a:t>Hypothesis 2 Conclusion</a:t>
+            </a:r>
+            <a:endParaRPr lang="en-CA" dirty="0"/>
+          </a:p>
+        </p:txBody>
+      </p:sp>
+      <p:sp>
+        <p:nvSpPr>
+          <p:cNvPr id="3" name="TextBox 2"/>
+          <p:cNvSpPr txBox="1"/>
+          <p:nvPr/>
+        </p:nvSpPr>
+        <p:spPr>
+          <a:xfrm>
+            <a:off x="2854411" y="5051735"/>
+            <a:ext cx="6668530" cy="646331"/>
+          </a:xfrm>
+          <a:prstGeom prst="rect">
+            <a:avLst/>
+          </a:prstGeom>
+          <a:noFill/>
+        </p:spPr>
+        <p:txBody>
+          <a:bodyPr wrap="square" rtlCol="0">
+            <a:spAutoFit/>
+          </a:bodyPr>
+          <a:lstStyle/>
+          <a:p>
+            <a:r>
+              <a:rPr lang="en-CA" dirty="0" smtClean="0"/>
+              <a:t>Almost all the highest paid occupations remained in their top spots, with a salary increase of almost 50k-100k increase over the span of 4 years.  </a:t>
+            </a:r>
+            <a:endParaRPr lang="en-CA" dirty="0"/>
+          </a:p>
+        </p:txBody>
+      </p:sp>
+      <p:pic>
+        <p:nvPicPr>
+          <p:cNvPr id="4" name="Picture 3"/>
+          <p:cNvPicPr>
+            <a:picLocks noChangeAspect="1"/>
+          </p:cNvPicPr>
+          <p:nvPr/>
+        </p:nvPicPr>
+        <p:blipFill>
+          <a:blip r:embed="rId2">
+            <a:extLst>
+              <a:ext uri="{28A0092B-C50C-407E-A947-70E740481C1C}">
+                <a14:useLocalDpi xmlns:a14="http://schemas.microsoft.com/office/drawing/2010/main" val="0"/>
+              </a:ext>
+            </a:extLst>
+          </a:blip>
+          <a:stretch>
+            <a:fillRect/>
+          </a:stretch>
+        </p:blipFill>
+        <p:spPr>
+          <a:xfrm>
+            <a:off x="3922927" y="1916838"/>
+            <a:ext cx="4346146" cy="2721065"/>
+          </a:xfrm>
+          <a:prstGeom prst="rect">
+            <a:avLst/>
+          </a:prstGeom>
+        </p:spPr>
+      </p:pic>
     </p:spTree>
     <p:extLst>
       <p:ext uri="{BB962C8B-B14F-4D97-AF65-F5344CB8AC3E}">
         <p14:creationId xmlns:p14="http://schemas.microsoft.com/office/powerpoint/2010/main" val="84461999"/>
+      </p:ext>
+    </p:extLst>
+  </p:cSld>
+  <p:clrMapOvr>
+    <a:masterClrMapping/>
+  </p:clrMapOvr>
+</p:sld>
+</file>
+
+<file path=ppt/slides/slide11.xml><?xml version="1.0" encoding="utf-8"?>
+<p:sld xmlns:a="http://schemas.openxmlformats.org/drawingml/2006/main" xmlns:r="http://schemas.openxmlformats.org/officeDocument/2006/relationships" xmlns:p="http://schemas.openxmlformats.org/presentationml/2006/main">
+  <p:cSld>
+    <p:spTree>
+      <p:nvGrpSpPr>
+        <p:cNvPr id="1" name=""/>
+        <p:cNvGrpSpPr/>
+        <p:nvPr/>
+      </p:nvGrpSpPr>
+      <p:grpSpPr>
+        <a:xfrm>
+          <a:off x="0" y="0"/>
+          <a:ext cx="0" cy="0"/>
+          <a:chOff x="0" y="0"/>
+          <a:chExt cx="0" cy="0"/>
+        </a:xfrm>
+      </p:grpSpPr>
+      <p:sp>
+        <p:nvSpPr>
+          <p:cNvPr id="3" name="Title 2"/>
+          <p:cNvSpPr>
+            <a:spLocks noGrp="1"/>
+          </p:cNvSpPr>
+          <p:nvPr>
+            <p:ph type="title"/>
+          </p:nvPr>
+        </p:nvSpPr>
+        <p:spPr/>
+        <p:txBody>
+          <a:bodyPr/>
+          <a:lstStyle/>
+          <a:p>
+            <a:r>
+              <a:rPr lang="en-CA" dirty="0" smtClean="0"/>
+              <a:t>Hypothesis 3</a:t>
+            </a:r>
+            <a:endParaRPr lang="en-CA" dirty="0"/>
+          </a:p>
+        </p:txBody>
+      </p:sp>
+      <p:sp>
+        <p:nvSpPr>
+          <p:cNvPr id="4" name="Content Placeholder 3"/>
+          <p:cNvSpPr>
+            <a:spLocks noGrp="1"/>
+          </p:cNvSpPr>
+          <p:nvPr>
+            <p:ph idx="1"/>
+          </p:nvPr>
+        </p:nvSpPr>
+        <p:spPr>
+          <a:xfrm>
+            <a:off x="1295401" y="2556932"/>
+            <a:ext cx="4421658" cy="3318936"/>
+          </a:xfrm>
+        </p:spPr>
+        <p:txBody>
+          <a:bodyPr/>
+          <a:lstStyle/>
+          <a:p>
+            <a:r>
+              <a:rPr lang="en-CA" dirty="0" smtClean="0"/>
+              <a:t>Since we know that there is a significant increase in salary for the top paying jobs, we believe that the middle-class should experience an increase as well.</a:t>
+            </a:r>
+          </a:p>
+          <a:p>
+            <a:r>
+              <a:rPr lang="en-CA" dirty="0" smtClean="0"/>
+              <a:t>However, we believe that the increase will not be as significant as the top paying jobs.  </a:t>
+            </a:r>
+            <a:endParaRPr lang="en-CA" dirty="0"/>
+          </a:p>
+        </p:txBody>
+      </p:sp>
+      <p:pic>
+        <p:nvPicPr>
+          <p:cNvPr id="1026" name="Picture 2" descr="http://lowres.jantoo.com/business-rich-poor-wealth-fat_cat-economics-07635319_low.jpg"/>
+          <p:cNvPicPr>
+            <a:picLocks noChangeAspect="1" noChangeArrowheads="1"/>
+          </p:cNvPicPr>
+          <p:nvPr/>
+        </p:nvPicPr>
+        <p:blipFill>
+          <a:blip r:embed="rId2">
+            <a:extLst>
+              <a:ext uri="{28A0092B-C50C-407E-A947-70E740481C1C}">
+                <a14:useLocalDpi xmlns:a14="http://schemas.microsoft.com/office/drawing/2010/main" val="0"/>
+              </a:ext>
+            </a:extLst>
+          </a:blip>
+          <a:srcRect/>
+          <a:stretch>
+            <a:fillRect/>
+          </a:stretch>
+        </p:blipFill>
+        <p:spPr bwMode="auto">
+          <a:xfrm>
+            <a:off x="6597561" y="2630487"/>
+            <a:ext cx="3810000" cy="3171826"/>
+          </a:xfrm>
+          <a:prstGeom prst="rect">
+            <a:avLst/>
+          </a:prstGeom>
+          <a:noFill/>
+          <a:extLst>
+            <a:ext uri="{909E8E84-426E-40DD-AFC4-6F175D3DCCD1}">
+              <a14:hiddenFill xmlns:a14="http://schemas.microsoft.com/office/drawing/2010/main">
+                <a:solidFill>
+                  <a:srgbClr val="FFFFFF"/>
+                </a:solidFill>
+              </a14:hiddenFill>
+            </a:ext>
+          </a:extLst>
+        </p:spPr>
+      </p:pic>
+    </p:spTree>
+    <p:extLst>
+      <p:ext uri="{BB962C8B-B14F-4D97-AF65-F5344CB8AC3E}">
+        <p14:creationId xmlns:p14="http://schemas.microsoft.com/office/powerpoint/2010/main" val="1476061892"/>
+      </p:ext>
+    </p:extLst>
+  </p:cSld>
+  <p:clrMapOvr>
+    <a:masterClrMapping/>
+  </p:clrMapOvr>
+</p:sld>
+</file>
+
+<file path=ppt/slides/slide12.xml><?xml version="1.0" encoding="utf-8"?>
+<p:sld xmlns:a="http://schemas.openxmlformats.org/drawingml/2006/main" xmlns:r="http://schemas.openxmlformats.org/officeDocument/2006/relationships" xmlns:p="http://schemas.openxmlformats.org/presentationml/2006/main">
+  <p:cSld>
+    <p:spTree>
+      <p:nvGrpSpPr>
+        <p:cNvPr id="1" name=""/>
+        <p:cNvGrpSpPr/>
+        <p:nvPr/>
+      </p:nvGrpSpPr>
+      <p:grpSpPr>
+        <a:xfrm>
+          <a:off x="0" y="0"/>
+          <a:ext cx="0" cy="0"/>
+          <a:chOff x="0" y="0"/>
+          <a:chExt cx="0" cy="0"/>
+        </a:xfrm>
+      </p:grpSpPr>
+      <p:sp>
+        <p:nvSpPr>
+          <p:cNvPr id="2" name="Title 1"/>
+          <p:cNvSpPr>
+            <a:spLocks noGrp="1"/>
+          </p:cNvSpPr>
+          <p:nvPr>
+            <p:ph type="title"/>
+          </p:nvPr>
+        </p:nvSpPr>
+        <p:spPr/>
+        <p:txBody>
+          <a:bodyPr/>
+          <a:lstStyle/>
+          <a:p>
+            <a:r>
+              <a:rPr lang="en-CA" dirty="0" smtClean="0"/>
+              <a:t>Choosing the 10 Mid-class jobs.</a:t>
+            </a:r>
+            <a:endParaRPr lang="en-CA" dirty="0"/>
+          </a:p>
+        </p:txBody>
+      </p:sp>
+      <p:sp>
+        <p:nvSpPr>
+          <p:cNvPr id="3" name="Content Placeholder 2"/>
+          <p:cNvSpPr>
+            <a:spLocks noGrp="1"/>
+          </p:cNvSpPr>
+          <p:nvPr>
+            <p:ph idx="1"/>
+          </p:nvPr>
+        </p:nvSpPr>
+        <p:spPr>
+          <a:xfrm>
+            <a:off x="1295402" y="2705213"/>
+            <a:ext cx="9273745" cy="3318936"/>
+          </a:xfrm>
+        </p:spPr>
+        <p:txBody>
+          <a:bodyPr/>
+          <a:lstStyle/>
+          <a:p>
+            <a:r>
+              <a:rPr lang="en-CA" dirty="0" smtClean="0"/>
+              <a:t>We did not want to choose the people on the opposite side of the spectrum, as that would be a bias comparison.</a:t>
+            </a:r>
+          </a:p>
+          <a:p>
+            <a:r>
+              <a:rPr lang="en-CA" dirty="0" smtClean="0"/>
+              <a:t>We chose people within the salary range of $25,000 - $32,000 as it was the rough midpoint of the dataset. </a:t>
+            </a:r>
+            <a:endParaRPr lang="en-CA" dirty="0"/>
+          </a:p>
+        </p:txBody>
+      </p:sp>
+    </p:spTree>
+    <p:extLst>
+      <p:ext uri="{BB962C8B-B14F-4D97-AF65-F5344CB8AC3E}">
+        <p14:creationId xmlns:p14="http://schemas.microsoft.com/office/powerpoint/2010/main" val="3542195665"/>
+      </p:ext>
+    </p:extLst>
+  </p:cSld>
+  <p:clrMapOvr>
+    <a:masterClrMapping/>
+  </p:clrMapOvr>
+</p:sld>
+</file>
+
+<file path=ppt/slides/slide13.xml><?xml version="1.0" encoding="utf-8"?>
+<p:sld xmlns:a="http://schemas.openxmlformats.org/drawingml/2006/main" xmlns:r="http://schemas.openxmlformats.org/officeDocument/2006/relationships" xmlns:p="http://schemas.openxmlformats.org/presentationml/2006/main">
+  <p:cSld>
+    <p:spTree>
+      <p:nvGrpSpPr>
+        <p:cNvPr id="1" name=""/>
+        <p:cNvGrpSpPr/>
+        <p:nvPr/>
+      </p:nvGrpSpPr>
+      <p:grpSpPr>
+        <a:xfrm>
+          <a:off x="0" y="0"/>
+          <a:ext cx="0" cy="0"/>
+          <a:chOff x="0" y="0"/>
+          <a:chExt cx="0" cy="0"/>
+        </a:xfrm>
+      </p:grpSpPr>
+      <p:pic>
+        <p:nvPicPr>
+          <p:cNvPr id="6" name="Picture 5"/>
+          <p:cNvPicPr>
+            <a:picLocks noChangeAspect="1"/>
+          </p:cNvPicPr>
+          <p:nvPr/>
+        </p:nvPicPr>
+        <p:blipFill>
+          <a:blip r:embed="rId2"/>
+          <a:stretch>
+            <a:fillRect/>
+          </a:stretch>
+        </p:blipFill>
+        <p:spPr>
+          <a:xfrm>
+            <a:off x="2665584" y="2287802"/>
+            <a:ext cx="6696075" cy="2990850"/>
+          </a:xfrm>
+          <a:prstGeom prst="rect">
+            <a:avLst/>
+          </a:prstGeom>
+        </p:spPr>
+      </p:pic>
+      <p:sp>
+        <p:nvSpPr>
+          <p:cNvPr id="7" name="Title 1"/>
+          <p:cNvSpPr txBox="1">
+            <a:spLocks/>
+          </p:cNvSpPr>
+          <p:nvPr/>
+        </p:nvSpPr>
+        <p:spPr>
+          <a:xfrm>
+            <a:off x="1295402" y="982132"/>
+            <a:ext cx="9601196" cy="1303867"/>
+          </a:xfrm>
+          <a:prstGeom prst="rect">
+            <a:avLst/>
+          </a:prstGeom>
+        </p:spPr>
+        <p:txBody>
+          <a:bodyPr/>
+          <a:lstStyle>
+            <a:lvl1pPr algn="ctr" defTabSz="457200" rtl="0" eaLnBrk="1" latinLnBrk="0" hangingPunct="1">
+              <a:spcBef>
+                <a:spcPct val="0"/>
+              </a:spcBef>
+              <a:buNone/>
+              <a:defRPr sz="4400" kern="1200" cap="none">
+                <a:ln w="3175" cmpd="sng">
+                  <a:noFill/>
+                </a:ln>
+                <a:solidFill>
+                  <a:schemeClr val="tx1">
+                    <a:lumMod val="85000"/>
+                    <a:lumOff val="15000"/>
+                  </a:schemeClr>
+                </a:solidFill>
+                <a:effectLst/>
+                <a:latin typeface="+mj-lt"/>
+                <a:ea typeface="+mj-ea"/>
+                <a:cs typeface="+mj-cs"/>
+              </a:defRPr>
+            </a:lvl1pPr>
+            <a:lvl2pPr eaLnBrk="1" hangingPunct="1">
+              <a:defRPr>
+                <a:solidFill>
+                  <a:schemeClr val="tx2"/>
+                </a:solidFill>
+              </a:defRPr>
+            </a:lvl2pPr>
+            <a:lvl3pPr eaLnBrk="1" hangingPunct="1">
+              <a:defRPr>
+                <a:solidFill>
+                  <a:schemeClr val="tx2"/>
+                </a:solidFill>
+              </a:defRPr>
+            </a:lvl3pPr>
+            <a:lvl4pPr eaLnBrk="1" hangingPunct="1">
+              <a:defRPr>
+                <a:solidFill>
+                  <a:schemeClr val="tx2"/>
+                </a:solidFill>
+              </a:defRPr>
+            </a:lvl4pPr>
+            <a:lvl5pPr eaLnBrk="1" hangingPunct="1">
+              <a:defRPr>
+                <a:solidFill>
+                  <a:schemeClr val="tx2"/>
+                </a:solidFill>
+              </a:defRPr>
+            </a:lvl5pPr>
+            <a:lvl6pPr eaLnBrk="1" hangingPunct="1">
+              <a:defRPr>
+                <a:solidFill>
+                  <a:schemeClr val="tx2"/>
+                </a:solidFill>
+              </a:defRPr>
+            </a:lvl6pPr>
+            <a:lvl7pPr eaLnBrk="1" hangingPunct="1">
+              <a:defRPr>
+                <a:solidFill>
+                  <a:schemeClr val="tx2"/>
+                </a:solidFill>
+              </a:defRPr>
+            </a:lvl7pPr>
+            <a:lvl8pPr eaLnBrk="1" hangingPunct="1">
+              <a:defRPr>
+                <a:solidFill>
+                  <a:schemeClr val="tx2"/>
+                </a:solidFill>
+              </a:defRPr>
+            </a:lvl8pPr>
+            <a:lvl9pPr eaLnBrk="1" hangingPunct="1">
+              <a:defRPr>
+                <a:solidFill>
+                  <a:schemeClr val="tx2"/>
+                </a:solidFill>
+              </a:defRPr>
+            </a:lvl9pPr>
+          </a:lstStyle>
+          <a:p>
+            <a:r>
+              <a:rPr lang="en-CA" dirty="0" smtClean="0"/>
+              <a:t>Our Mid-Class Dataset</a:t>
+            </a:r>
+            <a:endParaRPr lang="en-CA" dirty="0"/>
+          </a:p>
+        </p:txBody>
+      </p:sp>
+    </p:spTree>
+    <p:extLst>
+      <p:ext uri="{BB962C8B-B14F-4D97-AF65-F5344CB8AC3E}">
+        <p14:creationId xmlns:p14="http://schemas.microsoft.com/office/powerpoint/2010/main" val="1299646565"/>
+      </p:ext>
+    </p:extLst>
+  </p:cSld>
+  <p:clrMapOvr>
+    <a:masterClrMapping/>
+  </p:clrMapOvr>
+</p:sld>
+</file>
+
+<file path=ppt/slides/slide14.xml><?xml version="1.0" encoding="utf-8"?>
+<p:sld xmlns:a="http://schemas.openxmlformats.org/drawingml/2006/main" xmlns:r="http://schemas.openxmlformats.org/officeDocument/2006/relationships" xmlns:p="http://schemas.openxmlformats.org/presentationml/2006/main">
+  <p:cSld>
+    <p:spTree>
+      <p:nvGrpSpPr>
+        <p:cNvPr id="1" name=""/>
+        <p:cNvGrpSpPr/>
+        <p:nvPr/>
+      </p:nvGrpSpPr>
+      <p:grpSpPr>
+        <a:xfrm>
+          <a:off x="0" y="0"/>
+          <a:ext cx="0" cy="0"/>
+          <a:chOff x="0" y="0"/>
+          <a:chExt cx="0" cy="0"/>
+        </a:xfrm>
+      </p:grpSpPr>
+      <p:pic>
+        <p:nvPicPr>
+          <p:cNvPr id="2" name="Picture 1"/>
+          <p:cNvPicPr/>
+          <p:nvPr/>
+        </p:nvPicPr>
+        <p:blipFill>
+          <a:blip r:embed="rId2"/>
+          <a:stretch>
+            <a:fillRect/>
+          </a:stretch>
+        </p:blipFill>
+        <p:spPr>
+          <a:xfrm>
+            <a:off x="2514144" y="2153036"/>
+            <a:ext cx="6685915" cy="3705225"/>
+          </a:xfrm>
+          <a:prstGeom prst="rect">
+            <a:avLst/>
+          </a:prstGeom>
+        </p:spPr>
+      </p:pic>
+      <p:sp>
+        <p:nvSpPr>
+          <p:cNvPr id="3" name="Title 1"/>
+          <p:cNvSpPr txBox="1">
+            <a:spLocks/>
+          </p:cNvSpPr>
+          <p:nvPr/>
+        </p:nvSpPr>
+        <p:spPr>
+          <a:xfrm>
+            <a:off x="1295402" y="982132"/>
+            <a:ext cx="9601196" cy="1303867"/>
+          </a:xfrm>
+          <a:prstGeom prst="rect">
+            <a:avLst/>
+          </a:prstGeom>
+        </p:spPr>
+        <p:txBody>
+          <a:bodyPr/>
+          <a:lstStyle>
+            <a:lvl1pPr algn="ctr" defTabSz="457200" rtl="0" eaLnBrk="1" latinLnBrk="0" hangingPunct="1">
+              <a:spcBef>
+                <a:spcPct val="0"/>
+              </a:spcBef>
+              <a:buNone/>
+              <a:defRPr sz="4400" kern="1200" cap="none">
+                <a:ln w="3175" cmpd="sng">
+                  <a:noFill/>
+                </a:ln>
+                <a:solidFill>
+                  <a:schemeClr val="tx1">
+                    <a:lumMod val="85000"/>
+                    <a:lumOff val="15000"/>
+                  </a:schemeClr>
+                </a:solidFill>
+                <a:effectLst/>
+                <a:latin typeface="+mj-lt"/>
+                <a:ea typeface="+mj-ea"/>
+                <a:cs typeface="+mj-cs"/>
+              </a:defRPr>
+            </a:lvl1pPr>
+            <a:lvl2pPr eaLnBrk="1" hangingPunct="1">
+              <a:defRPr>
+                <a:solidFill>
+                  <a:schemeClr val="tx2"/>
+                </a:solidFill>
+              </a:defRPr>
+            </a:lvl2pPr>
+            <a:lvl3pPr eaLnBrk="1" hangingPunct="1">
+              <a:defRPr>
+                <a:solidFill>
+                  <a:schemeClr val="tx2"/>
+                </a:solidFill>
+              </a:defRPr>
+            </a:lvl3pPr>
+            <a:lvl4pPr eaLnBrk="1" hangingPunct="1">
+              <a:defRPr>
+                <a:solidFill>
+                  <a:schemeClr val="tx2"/>
+                </a:solidFill>
+              </a:defRPr>
+            </a:lvl4pPr>
+            <a:lvl5pPr eaLnBrk="1" hangingPunct="1">
+              <a:defRPr>
+                <a:solidFill>
+                  <a:schemeClr val="tx2"/>
+                </a:solidFill>
+              </a:defRPr>
+            </a:lvl5pPr>
+            <a:lvl6pPr eaLnBrk="1" hangingPunct="1">
+              <a:defRPr>
+                <a:solidFill>
+                  <a:schemeClr val="tx2"/>
+                </a:solidFill>
+              </a:defRPr>
+            </a:lvl6pPr>
+            <a:lvl7pPr eaLnBrk="1" hangingPunct="1">
+              <a:defRPr>
+                <a:solidFill>
+                  <a:schemeClr val="tx2"/>
+                </a:solidFill>
+              </a:defRPr>
+            </a:lvl7pPr>
+            <a:lvl8pPr eaLnBrk="1" hangingPunct="1">
+              <a:defRPr>
+                <a:solidFill>
+                  <a:schemeClr val="tx2"/>
+                </a:solidFill>
+              </a:defRPr>
+            </a:lvl8pPr>
+            <a:lvl9pPr eaLnBrk="1" hangingPunct="1">
+              <a:defRPr>
+                <a:solidFill>
+                  <a:schemeClr val="tx2"/>
+                </a:solidFill>
+              </a:defRPr>
+            </a:lvl9pPr>
+          </a:lstStyle>
+          <a:p>
+            <a:r>
+              <a:rPr lang="en-CA" dirty="0" smtClean="0"/>
+              <a:t>Bar Graph Results</a:t>
+            </a:r>
+            <a:endParaRPr lang="en-CA" dirty="0"/>
+          </a:p>
+        </p:txBody>
+      </p:sp>
+    </p:spTree>
+    <p:extLst>
+      <p:ext uri="{BB962C8B-B14F-4D97-AF65-F5344CB8AC3E}">
+        <p14:creationId xmlns:p14="http://schemas.microsoft.com/office/powerpoint/2010/main" val="117830020"/>
+      </p:ext>
+    </p:extLst>
+  </p:cSld>
+  <p:clrMapOvr>
+    <a:masterClrMapping/>
+  </p:clrMapOvr>
+</p:sld>
+</file>
+
+<file path=ppt/slides/slide15.xml><?xml version="1.0" encoding="utf-8"?>
+<p:sld xmlns:a="http://schemas.openxmlformats.org/drawingml/2006/main" xmlns:r="http://schemas.openxmlformats.org/officeDocument/2006/relationships" xmlns:p="http://schemas.openxmlformats.org/presentationml/2006/main">
+  <p:cSld>
+    <p:spTree>
+      <p:nvGrpSpPr>
+        <p:cNvPr id="1" name=""/>
+        <p:cNvGrpSpPr/>
+        <p:nvPr/>
+      </p:nvGrpSpPr>
+      <p:grpSpPr>
+        <a:xfrm>
+          <a:off x="0" y="0"/>
+          <a:ext cx="0" cy="0"/>
+          <a:chOff x="0" y="0"/>
+          <a:chExt cx="0" cy="0"/>
+        </a:xfrm>
+      </p:grpSpPr>
+      <p:sp>
+        <p:nvSpPr>
+          <p:cNvPr id="2" name="Title 1"/>
+          <p:cNvSpPr>
+            <a:spLocks noGrp="1"/>
+          </p:cNvSpPr>
+          <p:nvPr>
+            <p:ph type="title"/>
+          </p:nvPr>
+        </p:nvSpPr>
+        <p:spPr/>
+        <p:txBody>
+          <a:bodyPr>
+            <a:normAutofit/>
+          </a:bodyPr>
+          <a:lstStyle/>
+          <a:p>
+            <a:r>
+              <a:rPr lang="en-CA" dirty="0" smtClean="0"/>
+              <a:t>Hypothesis 3 Conclusion</a:t>
+            </a:r>
+            <a:endParaRPr lang="en-CA" dirty="0"/>
+          </a:p>
+        </p:txBody>
+      </p:sp>
+      <p:sp>
+        <p:nvSpPr>
+          <p:cNvPr id="3" name="Content Placeholder 2"/>
+          <p:cNvSpPr>
+            <a:spLocks noGrp="1"/>
+          </p:cNvSpPr>
+          <p:nvPr>
+            <p:ph idx="1"/>
+          </p:nvPr>
+        </p:nvSpPr>
+        <p:spPr>
+          <a:xfrm>
+            <a:off x="1295402" y="3018251"/>
+            <a:ext cx="9601196" cy="3318936"/>
+          </a:xfrm>
+        </p:spPr>
+        <p:txBody>
+          <a:bodyPr/>
+          <a:lstStyle/>
+          <a:p>
+            <a:r>
+              <a:rPr lang="en-CA" dirty="0" smtClean="0"/>
+              <a:t>Most jobs saw an increase in Salary as well, therefore we can conclude that almost all jobs, even lower paying jobs saw an increase in salary within this 4 year period. </a:t>
+            </a:r>
+            <a:endParaRPr lang="en-CA" dirty="0"/>
+          </a:p>
+        </p:txBody>
+      </p:sp>
+    </p:spTree>
+    <p:extLst>
+      <p:ext uri="{BB962C8B-B14F-4D97-AF65-F5344CB8AC3E}">
+        <p14:creationId xmlns:p14="http://schemas.microsoft.com/office/powerpoint/2010/main" val="66466325"/>
       </p:ext>
     </p:extLst>
   </p:cSld>
@@ -6066,7 +6856,15 @@
           <a:p>
             <a:r>
               <a:rPr lang="en-CA" dirty="0" smtClean="0"/>
-              <a:t>Dataset focuses on the Peak years of 2011 to 2014. </a:t>
+              <a:t>Dataset focuses on the </a:t>
+            </a:r>
+            <a:r>
+              <a:rPr lang="en-CA" dirty="0" smtClean="0"/>
+              <a:t>latest few years from </a:t>
+            </a:r>
+            <a:r>
+              <a:rPr lang="en-CA" dirty="0" smtClean="0"/>
+              <a:t>2011 to 2014. </a:t>
             </a:r>
             <a:endParaRPr lang="en-CA" dirty="0"/>
           </a:p>
@@ -6518,7 +7316,9 @@
           </a:xfrm>
         </p:spPr>
         <p:txBody>
-          <a:bodyPr/>
+          <a:bodyPr>
+            <a:normAutofit lnSpcReduction="10000"/>
+          </a:bodyPr>
           <a:lstStyle/>
           <a:p>
             <a:pPr marL="0" indent="0">
@@ -6548,17 +7348,21 @@
               <a:buNone/>
             </a:pPr>
             <a:r>
+              <a:rPr lang="en-CA" b="1" dirty="0" smtClean="0"/>
+              <a:t>Hypothesis:</a:t>
+            </a:r>
+          </a:p>
+          <a:p>
+            <a:pPr marL="0" indent="0">
+              <a:buNone/>
+            </a:pPr>
+            <a:r>
               <a:rPr lang="en-CA" dirty="0" smtClean="0"/>
-              <a:t>Hypothesis:</a:t>
-            </a:r>
-          </a:p>
-          <a:p>
-            <a:pPr marL="0" indent="0">
-              <a:buNone/>
-            </a:pPr>
+              <a:t>Those occupations will most likely see an increase in </a:t>
+            </a:r>
             <a:r>
               <a:rPr lang="en-CA" dirty="0" smtClean="0"/>
-              <a:t>Those occupations will most likely see an increase in salary. </a:t>
+              <a:t>salary over the next 3 years. </a:t>
             </a:r>
             <a:endParaRPr lang="en-CA" dirty="0"/>
           </a:p>
@@ -6850,8 +7654,8 @@
         </p:nvSpPr>
         <p:spPr>
           <a:xfrm>
-            <a:off x="1155700" y="1660956"/>
-            <a:ext cx="4470400" cy="3416320"/>
+            <a:off x="1866900" y="4838700"/>
+            <a:ext cx="7293576" cy="646331"/>
           </a:xfrm>
           <a:prstGeom prst="rect">
             <a:avLst/>
@@ -6865,282 +7669,61 @@
           <a:lstStyle/>
           <a:p>
             <a:r>
-              <a:rPr lang="en-CA" u="sng" dirty="0" smtClean="0"/>
-              <a:t>List of highest paying jobs in </a:t>
-            </a:r>
-            <a:r>
-              <a:rPr lang="en-CA" u="sng" dirty="0" smtClean="0"/>
-              <a:t>2011</a:t>
-            </a:r>
-          </a:p>
-          <a:p>
+              <a:rPr lang="en-CA" dirty="0" smtClean="0"/>
+              <a:t>Also, a recurring trend shows that </a:t>
+            </a:r>
+            <a:r>
+              <a:rPr lang="en-CA" dirty="0" smtClean="0"/>
+              <a:t>someone </a:t>
+            </a:r>
+            <a:r>
+              <a:rPr lang="en-CA" dirty="0" smtClean="0"/>
+              <a:t>with the title “Investor” </a:t>
+            </a:r>
+            <a:r>
+              <a:rPr lang="en-CA" dirty="0" smtClean="0"/>
+              <a:t>will always </a:t>
+            </a:r>
+            <a:r>
+              <a:rPr lang="en-CA" dirty="0" smtClean="0"/>
+              <a:t>present in the Top 10 salaries. </a:t>
+            </a:r>
+            <a:r>
+              <a:rPr lang="en-CA" dirty="0" smtClean="0"/>
+              <a:t>They even took the Top 1 spot in 2014. </a:t>
+            </a:r>
             <a:endParaRPr lang="en-CA" dirty="0"/>
           </a:p>
-          <a:p>
-            <a:r>
-              <a:rPr lang="en-US" dirty="0" smtClean="0"/>
-              <a:t>- Administrator</a:t>
-            </a:r>
-            <a:r>
-              <a:rPr lang="en-US" dirty="0"/>
-              <a:t>, SFGH medical center</a:t>
-            </a:r>
-          </a:p>
-          <a:p>
-            <a:r>
-              <a:rPr lang="en-US" dirty="0" smtClean="0"/>
-              <a:t>- Chief </a:t>
-            </a:r>
-            <a:r>
-              <a:rPr lang="en-US" dirty="0"/>
-              <a:t>of department(fire department)</a:t>
-            </a:r>
-          </a:p>
-          <a:p>
-            <a:r>
-              <a:rPr lang="en-US" dirty="0" smtClean="0"/>
-              <a:t>- Chief </a:t>
-            </a:r>
-            <a:r>
-              <a:rPr lang="en-US" dirty="0"/>
-              <a:t>of police</a:t>
-            </a:r>
-          </a:p>
-          <a:p>
-            <a:r>
-              <a:rPr lang="en-US" dirty="0" smtClean="0"/>
-              <a:t>- Department </a:t>
-            </a:r>
-            <a:r>
-              <a:rPr lang="en-US" dirty="0"/>
-              <a:t>head </a:t>
-            </a:r>
-            <a:r>
-              <a:rPr lang="en-US" dirty="0" smtClean="0"/>
-              <a:t>V</a:t>
-            </a:r>
-            <a:endParaRPr lang="en-US" dirty="0"/>
-          </a:p>
-          <a:p>
-            <a:r>
-              <a:rPr lang="en-US" dirty="0" smtClean="0"/>
-              <a:t>- Deputy </a:t>
-            </a:r>
-            <a:r>
-              <a:rPr lang="en-US" dirty="0"/>
-              <a:t>chief III (police department)</a:t>
-            </a:r>
-          </a:p>
-          <a:p>
-            <a:r>
-              <a:rPr lang="en-US" dirty="0" smtClean="0"/>
-              <a:t>- Deputy </a:t>
-            </a:r>
-            <a:r>
-              <a:rPr lang="en-US" dirty="0"/>
-              <a:t>chief of department (fire department) </a:t>
-            </a:r>
-          </a:p>
-          <a:p>
-            <a:r>
-              <a:rPr lang="en-US" dirty="0" smtClean="0"/>
-              <a:t>- Deputy </a:t>
-            </a:r>
-            <a:r>
-              <a:rPr lang="en-US" dirty="0"/>
-              <a:t>director of investments</a:t>
-            </a:r>
-          </a:p>
-          <a:p>
-            <a:r>
-              <a:rPr lang="en-US" dirty="0" smtClean="0"/>
-              <a:t>- </a:t>
-            </a:r>
-            <a:r>
-              <a:rPr lang="en-US" dirty="0"/>
-              <a:t>E</a:t>
-            </a:r>
-            <a:r>
-              <a:rPr lang="en-US" dirty="0" smtClean="0"/>
-              <a:t>xecutive </a:t>
-            </a:r>
-            <a:r>
-              <a:rPr lang="en-US" dirty="0"/>
-              <a:t>contract employee</a:t>
-            </a:r>
-          </a:p>
-          <a:p>
-            <a:r>
-              <a:rPr lang="en-US" dirty="0" smtClean="0"/>
-              <a:t>- General </a:t>
-            </a:r>
-            <a:r>
-              <a:rPr lang="en-US" dirty="0"/>
-              <a:t>manager metro transit authority</a:t>
-            </a:r>
-          </a:p>
-          <a:p>
-            <a:r>
-              <a:rPr lang="en-US" dirty="0" smtClean="0"/>
-              <a:t>- Port </a:t>
-            </a:r>
-            <a:r>
-              <a:rPr lang="en-US" dirty="0"/>
-              <a:t>director </a:t>
-            </a:r>
-            <a:endParaRPr lang="en-CA" dirty="0" smtClean="0"/>
-          </a:p>
-        </p:txBody>
-      </p:sp>
-      <p:sp>
-        <p:nvSpPr>
-          <p:cNvPr id="3" name="TextBox 2"/>
-          <p:cNvSpPr txBox="1"/>
+        </p:txBody>
+      </p:sp>
+      <p:pic>
+        <p:nvPicPr>
+          <p:cNvPr id="3" name="Picture 2"/>
+          <p:cNvPicPr>
+            <a:picLocks noChangeAspect="1"/>
+          </p:cNvPicPr>
           <p:nvPr/>
-        </p:nvSpPr>
-        <p:spPr>
-          <a:xfrm>
-            <a:off x="6629400" y="1660956"/>
-            <a:ext cx="4572001" cy="3970318"/>
+        </p:nvPicPr>
+        <p:blipFill>
+          <a:blip r:embed="rId2"/>
+          <a:stretch>
+            <a:fillRect/>
+          </a:stretch>
+        </p:blipFill>
+        <p:spPr>
+          <a:xfrm>
+            <a:off x="2126649" y="1307757"/>
+            <a:ext cx="7905750" cy="2743200"/>
           </a:xfrm>
           <a:prstGeom prst="rect">
             <a:avLst/>
           </a:prstGeom>
-          <a:noFill/>
-        </p:spPr>
-        <p:txBody>
-          <a:bodyPr wrap="square" rtlCol="0">
-            <a:spAutoFit/>
-          </a:bodyPr>
-          <a:lstStyle/>
-          <a:p>
-            <a:r>
-              <a:rPr lang="en-CA" u="sng" dirty="0" smtClean="0"/>
-              <a:t>List of highest paying jobs in </a:t>
-            </a:r>
-            <a:r>
-              <a:rPr lang="en-CA" u="sng" dirty="0" smtClean="0"/>
-              <a:t>2014</a:t>
-            </a:r>
-          </a:p>
-          <a:p>
-            <a:endParaRPr lang="en-CA" dirty="0"/>
-          </a:p>
-          <a:p>
-            <a:r>
-              <a:rPr lang="en-US" dirty="0" smtClean="0"/>
-              <a:t>- Administrator </a:t>
-            </a:r>
-            <a:r>
-              <a:rPr lang="en-US" dirty="0"/>
-              <a:t>San Francisco General Hospital Medical Center</a:t>
-            </a:r>
-            <a:endParaRPr lang="en-CA" dirty="0"/>
-          </a:p>
-          <a:p>
-            <a:r>
-              <a:rPr lang="en-US" dirty="0" smtClean="0"/>
-              <a:t>- Chief </a:t>
-            </a:r>
-            <a:r>
-              <a:rPr lang="en-US" dirty="0"/>
-              <a:t>of Department (Fire Department)</a:t>
-            </a:r>
-            <a:endParaRPr lang="en-CA" dirty="0"/>
-          </a:p>
-          <a:p>
-            <a:r>
-              <a:rPr lang="en-US" dirty="0" smtClean="0"/>
-              <a:t>- Chief </a:t>
-            </a:r>
-            <a:r>
-              <a:rPr lang="en-US" dirty="0"/>
-              <a:t>of Police</a:t>
-            </a:r>
-            <a:endParaRPr lang="en-CA" dirty="0"/>
-          </a:p>
-          <a:p>
-            <a:r>
-              <a:rPr lang="en-US" dirty="0" smtClean="0"/>
-              <a:t>- Department </a:t>
-            </a:r>
-            <a:r>
-              <a:rPr lang="en-US" dirty="0"/>
-              <a:t>Head</a:t>
-            </a:r>
-            <a:endParaRPr lang="en-CA" dirty="0"/>
-          </a:p>
-          <a:p>
-            <a:r>
-              <a:rPr lang="en-US" dirty="0" smtClean="0"/>
-              <a:t>- Deputy </a:t>
-            </a:r>
-            <a:r>
-              <a:rPr lang="en-US" dirty="0"/>
-              <a:t>Chief</a:t>
-            </a:r>
-            <a:endParaRPr lang="en-CA" dirty="0"/>
-          </a:p>
-          <a:p>
-            <a:r>
-              <a:rPr lang="en-US" dirty="0" smtClean="0"/>
-              <a:t>- General </a:t>
-            </a:r>
-            <a:r>
-              <a:rPr lang="en-US" dirty="0"/>
-              <a:t>Manager of Transit Authority</a:t>
-            </a:r>
-            <a:endParaRPr lang="en-CA" dirty="0"/>
-          </a:p>
-          <a:p>
-            <a:r>
-              <a:rPr lang="en-US" dirty="0" smtClean="0"/>
-              <a:t>- Port </a:t>
-            </a:r>
-            <a:r>
-              <a:rPr lang="en-US" dirty="0"/>
-              <a:t>Director</a:t>
-            </a:r>
-            <a:endParaRPr lang="en-CA" dirty="0"/>
-          </a:p>
-          <a:p>
-            <a:r>
-              <a:rPr lang="en-US" dirty="0" smtClean="0"/>
-              <a:t>- Executive </a:t>
-            </a:r>
-            <a:r>
-              <a:rPr lang="en-US" dirty="0"/>
-              <a:t>Contract Employee</a:t>
-            </a:r>
-            <a:endParaRPr lang="en-CA" dirty="0"/>
-          </a:p>
-          <a:p>
-            <a:r>
-              <a:rPr lang="en-US" dirty="0" smtClean="0"/>
-              <a:t>- Mayor</a:t>
-            </a:r>
-            <a:endParaRPr lang="en-CA" dirty="0"/>
-          </a:p>
-          <a:p>
-            <a:r>
-              <a:rPr lang="en-US" dirty="0" smtClean="0"/>
-              <a:t>- Chief </a:t>
-            </a:r>
-            <a:r>
-              <a:rPr lang="en-US" dirty="0"/>
-              <a:t>Investment Officer</a:t>
-            </a:r>
-            <a:endParaRPr lang="en-CA" dirty="0"/>
-          </a:p>
-          <a:p>
-            <a:endParaRPr lang="en-CA" dirty="0"/>
-          </a:p>
-        </p:txBody>
-      </p:sp>
+        </p:spPr>
+      </p:pic>
     </p:spTree>
     <p:extLst>
       <p:ext uri="{BB962C8B-B14F-4D97-AF65-F5344CB8AC3E}">
-        <p14:creationId xmlns:p14="http://schemas.microsoft.com/office/powerpoint/2010/main" val="3763460751"/>
+        <p14:creationId xmlns:p14="http://schemas.microsoft.com/office/powerpoint/2010/main" val="4285445836"/>
       </p:ext>
     </p:extLst>
   </p:cSld>
@@ -7175,8 +7758,8 @@
         </p:nvSpPr>
         <p:spPr>
           <a:xfrm>
-            <a:off x="1866900" y="4838700"/>
-            <a:ext cx="8699500" cy="646331"/>
+            <a:off x="1205126" y="1462225"/>
+            <a:ext cx="4470400" cy="3416320"/>
           </a:xfrm>
           <a:prstGeom prst="rect">
             <a:avLst/>
@@ -7190,9 +7773,474 @@
           <a:lstStyle/>
           <a:p>
             <a:r>
-              <a:rPr lang="en-CA" dirty="0" smtClean="0"/>
-              <a:t>Also, a recurring trend shows that there is always someone with the title “Investor” who is always present in the Top 10 salaries. </a:t>
-            </a:r>
+              <a:rPr lang="en-CA" u="sng" dirty="0" smtClean="0"/>
+              <a:t>List of highest paying jobs in 2011</a:t>
+            </a:r>
+          </a:p>
+          <a:p>
+            <a:endParaRPr lang="en-CA" dirty="0"/>
+          </a:p>
+          <a:p>
+            <a:r>
+              <a:rPr lang="en-US" dirty="0" smtClean="0">
+                <a:solidFill>
+                  <a:srgbClr val="92D050"/>
+                </a:solidFill>
+              </a:rPr>
+              <a:t>- Administrator</a:t>
+            </a:r>
+            <a:r>
+              <a:rPr lang="en-US" dirty="0">
+                <a:solidFill>
+                  <a:srgbClr val="92D050"/>
+                </a:solidFill>
+              </a:rPr>
+              <a:t>, SFGH medical center</a:t>
+            </a:r>
+          </a:p>
+          <a:p>
+            <a:r>
+              <a:rPr lang="en-US" dirty="0" smtClean="0">
+                <a:solidFill>
+                  <a:srgbClr val="92D050"/>
+                </a:solidFill>
+              </a:rPr>
+              <a:t>- Chief </a:t>
+            </a:r>
+            <a:r>
+              <a:rPr lang="en-US" dirty="0">
+                <a:solidFill>
+                  <a:srgbClr val="92D050"/>
+                </a:solidFill>
+              </a:rPr>
+              <a:t>of </a:t>
+            </a:r>
+            <a:r>
+              <a:rPr lang="en-US" dirty="0" smtClean="0">
+                <a:solidFill>
+                  <a:srgbClr val="92D050"/>
+                </a:solidFill>
+              </a:rPr>
+              <a:t>Department(fire </a:t>
+            </a:r>
+            <a:r>
+              <a:rPr lang="en-US" dirty="0">
+                <a:solidFill>
+                  <a:srgbClr val="92D050"/>
+                </a:solidFill>
+              </a:rPr>
+              <a:t>department)</a:t>
+            </a:r>
+          </a:p>
+          <a:p>
+            <a:r>
+              <a:rPr lang="en-US" dirty="0" smtClean="0">
+                <a:solidFill>
+                  <a:srgbClr val="92D050"/>
+                </a:solidFill>
+              </a:rPr>
+              <a:t>- Chief </a:t>
+            </a:r>
+            <a:r>
+              <a:rPr lang="en-US" dirty="0">
+                <a:solidFill>
+                  <a:srgbClr val="92D050"/>
+                </a:solidFill>
+              </a:rPr>
+              <a:t>of </a:t>
+            </a:r>
+            <a:r>
+              <a:rPr lang="en-US" dirty="0" smtClean="0">
+                <a:solidFill>
+                  <a:srgbClr val="92D050"/>
+                </a:solidFill>
+              </a:rPr>
+              <a:t>Police</a:t>
+            </a:r>
+            <a:endParaRPr lang="en-US" dirty="0">
+              <a:solidFill>
+                <a:srgbClr val="92D050"/>
+              </a:solidFill>
+            </a:endParaRPr>
+          </a:p>
+          <a:p>
+            <a:r>
+              <a:rPr lang="en-US" dirty="0" smtClean="0">
+                <a:solidFill>
+                  <a:srgbClr val="92D050"/>
+                </a:solidFill>
+              </a:rPr>
+              <a:t>- Department </a:t>
+            </a:r>
+            <a:r>
+              <a:rPr lang="en-US" dirty="0" smtClean="0">
+                <a:solidFill>
+                  <a:srgbClr val="92D050"/>
+                </a:solidFill>
+              </a:rPr>
+              <a:t>Head </a:t>
+            </a:r>
+            <a:r>
+              <a:rPr lang="en-US" dirty="0" smtClean="0">
+                <a:solidFill>
+                  <a:srgbClr val="92D050"/>
+                </a:solidFill>
+              </a:rPr>
+              <a:t>V</a:t>
+            </a:r>
+            <a:endParaRPr lang="en-US" dirty="0">
+              <a:solidFill>
+                <a:srgbClr val="92D050"/>
+              </a:solidFill>
+            </a:endParaRPr>
+          </a:p>
+          <a:p>
+            <a:r>
+              <a:rPr lang="en-US" dirty="0" smtClean="0">
+                <a:solidFill>
+                  <a:srgbClr val="92D050"/>
+                </a:solidFill>
+              </a:rPr>
+              <a:t>- Deputy Chief </a:t>
+            </a:r>
+            <a:r>
+              <a:rPr lang="en-US" dirty="0">
+                <a:solidFill>
+                  <a:srgbClr val="92D050"/>
+                </a:solidFill>
+              </a:rPr>
+              <a:t>III (police department</a:t>
+            </a:r>
+            <a:r>
+              <a:rPr lang="en-US" dirty="0">
+                <a:solidFill>
+                  <a:srgbClr val="92D050"/>
+                </a:solidFill>
+              </a:rPr>
+              <a:t>) </a:t>
+            </a:r>
+            <a:endParaRPr lang="en-US" dirty="0" smtClean="0">
+              <a:solidFill>
+                <a:srgbClr val="92D050"/>
+              </a:solidFill>
+            </a:endParaRPr>
+          </a:p>
+          <a:p>
+            <a:r>
+              <a:rPr lang="en-US" dirty="0" smtClean="0">
+                <a:solidFill>
+                  <a:srgbClr val="92D050"/>
+                </a:solidFill>
+              </a:rPr>
+              <a:t>- </a:t>
+            </a:r>
+            <a:r>
+              <a:rPr lang="en-US" dirty="0">
+                <a:solidFill>
+                  <a:srgbClr val="92D050"/>
+                </a:solidFill>
+              </a:rPr>
+              <a:t>General manager metro transit authority</a:t>
+            </a:r>
+          </a:p>
+          <a:p>
+            <a:r>
+              <a:rPr lang="en-US" dirty="0">
+                <a:solidFill>
+                  <a:srgbClr val="92D050"/>
+                </a:solidFill>
+              </a:rPr>
+              <a:t>- Port director </a:t>
+            </a:r>
+            <a:endParaRPr lang="en-CA" dirty="0">
+              <a:solidFill>
+                <a:srgbClr val="92D050"/>
+              </a:solidFill>
+            </a:endParaRPr>
+          </a:p>
+          <a:p>
+            <a:r>
+              <a:rPr lang="en-US" dirty="0">
+                <a:solidFill>
+                  <a:srgbClr val="92D050"/>
+                </a:solidFill>
+              </a:rPr>
+              <a:t>- Executive contract </a:t>
+            </a:r>
+            <a:r>
+              <a:rPr lang="en-US" dirty="0" smtClean="0">
+                <a:solidFill>
+                  <a:srgbClr val="92D050"/>
+                </a:solidFill>
+              </a:rPr>
+              <a:t>employee</a:t>
+            </a:r>
+            <a:endParaRPr lang="en-US" dirty="0">
+              <a:solidFill>
+                <a:srgbClr val="92D050"/>
+              </a:solidFill>
+            </a:endParaRPr>
+          </a:p>
+          <a:p>
+            <a:r>
+              <a:rPr lang="en-US" dirty="0" smtClean="0"/>
+              <a:t>- Deputy </a:t>
+            </a:r>
+            <a:r>
+              <a:rPr lang="en-US" dirty="0"/>
+              <a:t>chief of department (fire department) </a:t>
+            </a:r>
+          </a:p>
+          <a:p>
+            <a:r>
+              <a:rPr lang="en-US" dirty="0" smtClean="0"/>
+              <a:t>- Deputy </a:t>
+            </a:r>
+            <a:r>
+              <a:rPr lang="en-US" dirty="0"/>
+              <a:t>director of </a:t>
+            </a:r>
+            <a:r>
+              <a:rPr lang="en-US" dirty="0" smtClean="0"/>
+              <a:t>investments</a:t>
+            </a:r>
+            <a:endParaRPr lang="en-US" dirty="0"/>
+          </a:p>
+        </p:txBody>
+      </p:sp>
+      <p:sp>
+        <p:nvSpPr>
+          <p:cNvPr id="3" name="TextBox 2"/>
+          <p:cNvSpPr txBox="1"/>
+          <p:nvPr/>
+        </p:nvSpPr>
+        <p:spPr>
+          <a:xfrm>
+            <a:off x="5675526" y="1462225"/>
+            <a:ext cx="5857102" cy="3693319"/>
+          </a:xfrm>
+          <a:prstGeom prst="rect">
+            <a:avLst/>
+          </a:prstGeom>
+          <a:noFill/>
+        </p:spPr>
+        <p:txBody>
+          <a:bodyPr wrap="square" rtlCol="0">
+            <a:spAutoFit/>
+          </a:bodyPr>
+          <a:lstStyle/>
+          <a:p>
+            <a:r>
+              <a:rPr lang="en-CA" u="sng" dirty="0" smtClean="0"/>
+              <a:t>List of highest paying jobs in 2014</a:t>
+            </a:r>
+          </a:p>
+          <a:p>
+            <a:endParaRPr lang="en-CA" dirty="0"/>
+          </a:p>
+          <a:p>
+            <a:r>
+              <a:rPr lang="en-US" dirty="0" smtClean="0">
+                <a:solidFill>
+                  <a:srgbClr val="92D050"/>
+                </a:solidFill>
+              </a:rPr>
+              <a:t>- Administrator </a:t>
+            </a:r>
+            <a:r>
+              <a:rPr lang="en-US" dirty="0">
+                <a:solidFill>
+                  <a:srgbClr val="92D050"/>
+                </a:solidFill>
+              </a:rPr>
+              <a:t>San Francisco General Hospital Medical Center</a:t>
+            </a:r>
+            <a:endParaRPr lang="en-CA" dirty="0">
+              <a:solidFill>
+                <a:srgbClr val="92D050"/>
+              </a:solidFill>
+            </a:endParaRPr>
+          </a:p>
+          <a:p>
+            <a:r>
+              <a:rPr lang="en-US" dirty="0" smtClean="0">
+                <a:solidFill>
+                  <a:srgbClr val="92D050"/>
+                </a:solidFill>
+              </a:rPr>
+              <a:t>- Chief </a:t>
+            </a:r>
+            <a:r>
+              <a:rPr lang="en-US" dirty="0">
+                <a:solidFill>
+                  <a:srgbClr val="92D050"/>
+                </a:solidFill>
+              </a:rPr>
+              <a:t>of Department (Fire Department)</a:t>
+            </a:r>
+            <a:endParaRPr lang="en-CA" dirty="0">
+              <a:solidFill>
+                <a:srgbClr val="92D050"/>
+              </a:solidFill>
+            </a:endParaRPr>
+          </a:p>
+          <a:p>
+            <a:r>
+              <a:rPr lang="en-US" dirty="0" smtClean="0">
+                <a:solidFill>
+                  <a:srgbClr val="92D050"/>
+                </a:solidFill>
+              </a:rPr>
+              <a:t>- Chief </a:t>
+            </a:r>
+            <a:r>
+              <a:rPr lang="en-US" dirty="0">
+                <a:solidFill>
+                  <a:srgbClr val="92D050"/>
+                </a:solidFill>
+              </a:rPr>
+              <a:t>of Police</a:t>
+            </a:r>
+            <a:endParaRPr lang="en-CA" dirty="0">
+              <a:solidFill>
+                <a:srgbClr val="92D050"/>
+              </a:solidFill>
+            </a:endParaRPr>
+          </a:p>
+          <a:p>
+            <a:r>
+              <a:rPr lang="en-US" dirty="0" smtClean="0">
+                <a:solidFill>
+                  <a:srgbClr val="92D050"/>
+                </a:solidFill>
+              </a:rPr>
+              <a:t>- Department </a:t>
+            </a:r>
+            <a:r>
+              <a:rPr lang="en-US" dirty="0">
+                <a:solidFill>
+                  <a:srgbClr val="92D050"/>
+                </a:solidFill>
+              </a:rPr>
+              <a:t>Head</a:t>
+            </a:r>
+            <a:endParaRPr lang="en-CA" dirty="0">
+              <a:solidFill>
+                <a:srgbClr val="92D050"/>
+              </a:solidFill>
+            </a:endParaRPr>
+          </a:p>
+          <a:p>
+            <a:r>
+              <a:rPr lang="en-US" dirty="0" smtClean="0">
+                <a:solidFill>
+                  <a:srgbClr val="92D050"/>
+                </a:solidFill>
+              </a:rPr>
+              <a:t>- Deputy </a:t>
+            </a:r>
+            <a:r>
+              <a:rPr lang="en-US" dirty="0">
+                <a:solidFill>
+                  <a:srgbClr val="92D050"/>
+                </a:solidFill>
+              </a:rPr>
+              <a:t>Chief</a:t>
+            </a:r>
+            <a:endParaRPr lang="en-CA" dirty="0">
+              <a:solidFill>
+                <a:srgbClr val="92D050"/>
+              </a:solidFill>
+            </a:endParaRPr>
+          </a:p>
+          <a:p>
+            <a:r>
+              <a:rPr lang="en-US" dirty="0" smtClean="0">
+                <a:solidFill>
+                  <a:srgbClr val="92D050"/>
+                </a:solidFill>
+              </a:rPr>
+              <a:t>- General </a:t>
+            </a:r>
+            <a:r>
+              <a:rPr lang="en-US" dirty="0">
+                <a:solidFill>
+                  <a:srgbClr val="92D050"/>
+                </a:solidFill>
+              </a:rPr>
+              <a:t>Manager of Transit Authority</a:t>
+            </a:r>
+            <a:endParaRPr lang="en-CA" dirty="0">
+              <a:solidFill>
+                <a:srgbClr val="92D050"/>
+              </a:solidFill>
+            </a:endParaRPr>
+          </a:p>
+          <a:p>
+            <a:r>
+              <a:rPr lang="en-US" dirty="0" smtClean="0">
+                <a:solidFill>
+                  <a:srgbClr val="92D050"/>
+                </a:solidFill>
+              </a:rPr>
+              <a:t>- Port </a:t>
+            </a:r>
+            <a:r>
+              <a:rPr lang="en-US" dirty="0">
+                <a:solidFill>
+                  <a:srgbClr val="92D050"/>
+                </a:solidFill>
+              </a:rPr>
+              <a:t>Director</a:t>
+            </a:r>
+            <a:endParaRPr lang="en-CA" dirty="0">
+              <a:solidFill>
+                <a:srgbClr val="92D050"/>
+              </a:solidFill>
+            </a:endParaRPr>
+          </a:p>
+          <a:p>
+            <a:r>
+              <a:rPr lang="en-US" dirty="0" smtClean="0">
+                <a:solidFill>
+                  <a:srgbClr val="92D050"/>
+                </a:solidFill>
+              </a:rPr>
+              <a:t>- Executive </a:t>
+            </a:r>
+            <a:r>
+              <a:rPr lang="en-US" dirty="0">
+                <a:solidFill>
+                  <a:srgbClr val="92D050"/>
+                </a:solidFill>
+              </a:rPr>
+              <a:t>Contract Employee</a:t>
+            </a:r>
+            <a:endParaRPr lang="en-CA" dirty="0">
+              <a:solidFill>
+                <a:srgbClr val="92D050"/>
+              </a:solidFill>
+            </a:endParaRPr>
+          </a:p>
+          <a:p>
+            <a:r>
+              <a:rPr lang="en-US" dirty="0" smtClean="0"/>
+              <a:t>- Mayor</a:t>
+            </a:r>
+            <a:endParaRPr lang="en-CA" dirty="0"/>
+          </a:p>
+          <a:p>
+            <a:r>
+              <a:rPr lang="en-US" dirty="0" smtClean="0"/>
+              <a:t>- Chief </a:t>
+            </a:r>
+            <a:r>
+              <a:rPr lang="en-US" dirty="0"/>
+              <a:t>Investment Officer</a:t>
+            </a:r>
+            <a:endParaRPr lang="en-CA" dirty="0"/>
+          </a:p>
+          <a:p>
             <a:endParaRPr lang="en-CA" dirty="0"/>
           </a:p>
         </p:txBody>
@@ -7200,7 +8248,7 @@
     </p:spTree>
     <p:extLst>
       <p:ext uri="{BB962C8B-B14F-4D97-AF65-F5344CB8AC3E}">
-        <p14:creationId xmlns:p14="http://schemas.microsoft.com/office/powerpoint/2010/main" val="4285445836"/>
+        <p14:creationId xmlns:p14="http://schemas.microsoft.com/office/powerpoint/2010/main" val="3763460751"/>
       </p:ext>
     </p:extLst>
   </p:cSld>

</xml_diff>